<commit_message>
Added github address to slides.
</commit_message>
<xml_diff>
--- a/MATLAB GUIs.pptx
+++ b/MATLAB GUIs.pptx
@@ -12107,6 +12107,44 @@
                 </a:solidFill>
               </a:rPr>
               <a:t>In Action</a:t>
+            </a:r>
+          </a:p>
+        </p:txBody>
+      </p:sp>
+      <p:sp>
+        <p:nvSpPr>
+          <p:cNvPr id="213" name="Shape 213"/>
+          <p:cNvSpPr txBox="1"/>
+          <p:nvPr/>
+        </p:nvSpPr>
+        <p:spPr>
+          <a:xfrm>
+            <a:off x="5569075" y="6031150"/>
+            <a:ext cx="3400200" cy="364800"/>
+          </a:xfrm>
+          <a:prstGeom prst="rect">
+            <a:avLst/>
+          </a:prstGeom>
+          <a:noFill/>
+          <a:ln>
+            <a:noFill/>
+          </a:ln>
+        </p:spPr>
+        <p:txBody>
+          <a:bodyPr anchorCtr="0" anchor="t" bIns="91425" lIns="91425" rIns="91425" tIns="91425">
+            <a:noAutofit/>
+          </a:bodyPr>
+          <a:lstStyle/>
+          <a:p>
+            <a:pPr lvl="0">
+              <a:spcBef>
+                <a:spcPts val="0"/>
+              </a:spcBef>
+              <a:buNone/>
+            </a:pPr>
+            <a:r>
+              <a:rPr lang="en-US" sz="1200"/>
+              <a:t>https://github.com/EddyTheB/HarmonicSeries</a:t>
             </a:r>
           </a:p>
         </p:txBody>

</xml_diff>